<commit_message>
Update WDS trainer presentation - Security baseline on Azure.pptx
Added Alt Text back
</commit_message>
<xml_diff>
--- a/Whiteboard design session/WDS trainer presentation - Security baseline on Azure.pptx
+++ b/Whiteboard design session/WDS trainer presentation - Security baseline on Azure.pptx
@@ -235,7 +235,7 @@
           <a:p>
             <a:fld id="{52A13B17-C506-4D51-BB37-16B365906619}" type="datetimeFigureOut">
               <a:rPr lang="en-US" smtClean="0"/>
-              <a:t>4/22/2019</a:t>
+              <a:t>4/26/2019</a:t>
             </a:fld>
             <a:endParaRPr lang="en-US" dirty="0"/>
           </a:p>
@@ -3466,7 +3466,7 @@
                   <a:prstClr val="black"/>
                 </a:solidFill>
               </a:rPr>
-              <a:t>4/22/2019 6:19 PM</a:t>
+              <a:t>4/26/2019 8:37 AM</a:t>
             </a:fld>
             <a:endParaRPr lang="en-US" dirty="0">
               <a:solidFill>
@@ -17483,7 +17483,7 @@
       </p:sp>
       <p:pic>
         <p:nvPicPr>
-          <p:cNvPr id="5" name="Picture 4">
+          <p:cNvPr id="5" name="Picture 4" descr="High-level network architecture&#10;&#10;On the left, an Admin icon and an Agent icon point at an internet icon, which points at a box in the middle. In this box are two intermediate icons for Azure Firewall and Just In Time, then three smaller boxes (WEB-1, PAW-1, and DB-1) that are interconnected with icons for Azure SQL, a DNS server, and an icon of a key on a green circle. The big box in the middle points to four different sites labeled Site 1–4.">
             <a:extLst>
               <a:ext uri="{FF2B5EF4-FFF2-40B4-BE49-F238E27FC236}">
                 <a16:creationId xmlns:a16="http://schemas.microsoft.com/office/drawing/2014/main" id="{DAE7A831-BF04-4523-9DD8-62EAEB3230C7}"/>
@@ -17594,7 +17594,7 @@
       </p:sp>
       <p:pic>
         <p:nvPicPr>
-          <p:cNvPr id="3" name="Picture 2">
+          <p:cNvPr id="3" name="Picture 2" descr="High-level auditing and compliance&#10;&#10;On the left, Admin, DPO icons point at other icons and icons inside another large box. Inside the box are various icons and three smaller boxes with similarly clustered icons: WEB, DB, and Main; DB, Web, and PAW; and DB, Web, and Main.  In the center is Azure Sentinel with Log Analytics as the auditing and alerting core.">
             <a:extLst>
               <a:ext uri="{FF2B5EF4-FFF2-40B4-BE49-F238E27FC236}">
                 <a16:creationId xmlns:a16="http://schemas.microsoft.com/office/drawing/2014/main" id="{C5610748-3000-4289-8D30-B1A994D3CF28}"/>
@@ -20876,6 +20876,15 @@
 </file>
 
 <file path=customXml/item1.xml><?xml version="1.0" encoding="utf-8"?>
+<?mso-contentType ?>
+<FormTemplates xmlns="http://schemas.microsoft.com/sharepoint/v3/contenttype/forms">
+  <Display>DocumentLibraryForm</Display>
+  <Edit>DocumentLibraryForm</Edit>
+  <New>DocumentLibraryForm</New>
+</FormTemplates>
+</file>
+
+<file path=customXml/item2.xml><?xml version="1.0" encoding="utf-8"?>
 <ct:contentTypeSchema xmlns:ct="http://schemas.microsoft.com/office/2006/metadata/contentType" xmlns:ma="http://schemas.microsoft.com/office/2006/metadata/properties/metaAttributes" ct:_="" ma:_="" ma:contentTypeName="Document" ma:contentTypeID="0x010100D15DFA3690A15B4081582BBCC6BEAC3E" ma:contentTypeVersion="9" ma:contentTypeDescription="Create a new document." ma:contentTypeScope="" ma:versionID="642da1784587cbe85a7fdbbe4dc36103">
   <xsd:schema xmlns:xsd="http://www.w3.org/2001/XMLSchema" xmlns:xs="http://www.w3.org/2001/XMLSchema" xmlns:p="http://schemas.microsoft.com/office/2006/metadata/properties" xmlns:ns1="http://schemas.microsoft.com/sharepoint/v3" xmlns:ns2="2023ac63-7b75-4916-a9ee-591457758eee" xmlns:ns3="d9c797ad-d7c3-4982-82b7-81352a75e4a5" targetNamespace="http://schemas.microsoft.com/office/2006/metadata/properties" ma:root="true" ma:fieldsID="91198b0246576053cc55dd2c67035a89" ns1:_="" ns2:_="" ns3:_="">
     <xsd:import namespace="http://schemas.microsoft.com/sharepoint/v3"/>
@@ -21077,15 +21086,6 @@
 </ct:contentTypeSchema>
 </file>
 
-<file path=customXml/item2.xml><?xml version="1.0" encoding="utf-8"?>
-<?mso-contentType ?>
-<FormTemplates xmlns="http://schemas.microsoft.com/sharepoint/v3/contenttype/forms">
-  <Display>DocumentLibraryForm</Display>
-  <Edit>DocumentLibraryForm</Edit>
-  <New>DocumentLibraryForm</New>
-</FormTemplates>
-</file>
-
 <file path=customXml/item3.xml><?xml version="1.0" encoding="utf-8"?>
 <p:properties xmlns:p="http://schemas.microsoft.com/office/2006/metadata/properties" xmlns:xsi="http://www.w3.org/2001/XMLSchema-instance" xmlns:pc="http://schemas.microsoft.com/office/infopath/2007/PartnerControls">
   <documentManagement>
@@ -21096,6 +21096,14 @@
 </file>
 
 <file path=customXml/itemProps1.xml><?xml version="1.0" encoding="utf-8"?>
+<ds:datastoreItem xmlns:ds="http://schemas.openxmlformats.org/officeDocument/2006/customXml" ds:itemID="{B548A0C0-DC97-4384-A030-1862D9120D4E}">
+  <ds:schemaRefs>
+    <ds:schemaRef ds:uri="http://schemas.microsoft.com/sharepoint/v3/contenttype/forms"/>
+  </ds:schemaRefs>
+</ds:datastoreItem>
+</file>
+
+<file path=customXml/itemProps2.xml><?xml version="1.0" encoding="utf-8"?>
 <ds:datastoreItem xmlns:ds="http://schemas.openxmlformats.org/officeDocument/2006/customXml" ds:itemID="{073ED2AD-E7AD-4156-9686-5BAF016490A0}">
   <ds:schemaRefs>
     <ds:schemaRef ds:uri="http://schemas.microsoft.com/office/2006/metadata/contentType"/>
@@ -21111,14 +21119,6 @@
     <ds:schemaRef ds:uri="http://purl.org/dc/elements/1.1/"/>
     <ds:schemaRef ds:uri="http://purl.org/dc/terms/"/>
     <ds:schemaRef ds:uri="http://schemas.microsoft.com/internal/obd"/>
-  </ds:schemaRefs>
-</ds:datastoreItem>
-</file>
-
-<file path=customXml/itemProps2.xml><?xml version="1.0" encoding="utf-8"?>
-<ds:datastoreItem xmlns:ds="http://schemas.openxmlformats.org/officeDocument/2006/customXml" ds:itemID="{B548A0C0-DC97-4384-A030-1862D9120D4E}">
-  <ds:schemaRefs>
-    <ds:schemaRef ds:uri="http://schemas.microsoft.com/sharepoint/v3/contenttype/forms"/>
   </ds:schemaRefs>
 </ds:datastoreItem>
 </file>

</xml_diff>

<commit_message>
Add the missing objection in slides, update the image (again).
</commit_message>
<xml_diff>
--- a/Whiteboard design session/WDS trainer presentation - Security baseline on Azure.pptx
+++ b/Whiteboard design session/WDS trainer presentation - Security baseline on Azure.pptx
@@ -235,7 +235,7 @@
           <a:p>
             <a:fld id="{52A13B17-C506-4D51-BB37-16B365906619}" type="datetimeFigureOut">
               <a:rPr lang="en-US" smtClean="0"/>
-              <a:t>4/26/2019</a:t>
+              <a:t>11/18/2019</a:t>
             </a:fld>
             <a:endParaRPr lang="en-US" dirty="0"/>
           </a:p>
@@ -1834,6 +1834,139 @@
             </a:endParaRPr>
           </a:p>
           <a:p>
+            <a:endParaRPr lang="en-US" b="1" dirty="0"/>
+          </a:p>
+          <a:p>
+            <a:r>
+              <a:rPr lang="en-US" b="1" dirty="0"/>
+              <a:t>Is Azure SQL secure enough to host their application databases?</a:t>
+            </a:r>
+          </a:p>
+          <a:p>
+            <a:r>
+              <a:rPr lang="en-US" sz="1200" b="0" kern="1200" dirty="0">
+                <a:solidFill>
+                  <a:schemeClr val="tx1"/>
+                </a:solidFill>
+                <a:effectLst/>
+                <a:latin typeface="+mn-lt"/>
+                <a:ea typeface="+mn-ea"/>
+                <a:cs typeface="+mn-cs"/>
+              </a:rPr>
+              <a:t>Transparent data encryption performs </a:t>
+            </a:r>
+            <a:r>
+              <a:rPr lang="en-US" sz="1200" b="0" kern="1200" dirty="0" err="1">
+                <a:solidFill>
+                  <a:schemeClr val="tx1"/>
+                </a:solidFill>
+                <a:effectLst/>
+                <a:latin typeface="+mn-lt"/>
+                <a:ea typeface="+mn-ea"/>
+                <a:cs typeface="+mn-cs"/>
+              </a:rPr>
+              <a:t>realtime</a:t>
+            </a:r>
+            <a:r>
+              <a:rPr lang="en-US" sz="1200" b="0" kern="1200" dirty="0">
+                <a:solidFill>
+                  <a:schemeClr val="tx1"/>
+                </a:solidFill>
+                <a:effectLst/>
+                <a:latin typeface="+mn-lt"/>
+                <a:ea typeface="+mn-ea"/>
+                <a:cs typeface="+mn-cs"/>
+              </a:rPr>
+              <a:t> encryption and decryption of the database, associated backups, and transaction log files to protect information at rest. Transparent data encryption provides assurance that stored data hasn't been subject to unauthorized access.</a:t>
+            </a:r>
+          </a:p>
+          <a:p>
+            <a:br>
+              <a:rPr lang="en-US" sz="1200" b="0" kern="1200" dirty="0">
+                <a:solidFill>
+                  <a:schemeClr val="tx1"/>
+                </a:solidFill>
+                <a:effectLst/>
+                <a:latin typeface="+mn-lt"/>
+                <a:ea typeface="+mn-ea"/>
+                <a:cs typeface="+mn-cs"/>
+              </a:rPr>
+            </a:br>
+            <a:r>
+              <a:rPr lang="en-US" sz="1200" b="0" kern="1200" dirty="0">
+                <a:solidFill>
+                  <a:schemeClr val="tx1"/>
+                </a:solidFill>
+                <a:effectLst/>
+                <a:latin typeface="+mn-lt"/>
+                <a:ea typeface="+mn-ea"/>
+                <a:cs typeface="+mn-cs"/>
+              </a:rPr>
+              <a:t>Firewall rules prevent all access to database servers until proper permissions are granted. The firewall grants access to databases based on the originating IP address of each request.</a:t>
+            </a:r>
+          </a:p>
+          <a:p>
+            <a:br>
+              <a:rPr lang="en-US" sz="1200" b="0" kern="1200" dirty="0">
+                <a:solidFill>
+                  <a:schemeClr val="tx1"/>
+                </a:solidFill>
+                <a:effectLst/>
+                <a:latin typeface="+mn-lt"/>
+                <a:ea typeface="+mn-ea"/>
+                <a:cs typeface="+mn-cs"/>
+              </a:rPr>
+            </a:br>
+            <a:r>
+              <a:rPr lang="en-US" sz="1200" b="0" kern="1200" dirty="0">
+                <a:solidFill>
+                  <a:schemeClr val="tx1"/>
+                </a:solidFill>
+                <a:effectLst/>
+                <a:latin typeface="+mn-lt"/>
+                <a:ea typeface="+mn-ea"/>
+                <a:cs typeface="+mn-cs"/>
+              </a:rPr>
+              <a:t>Encrypted columns ensure that sensitive data never appears as plain text inside the database system. After data encryption is enabled, only client applications or application servers with access to the keys can access plain-text data.</a:t>
+            </a:r>
+          </a:p>
+          <a:p>
+            <a:br>
+              <a:rPr lang="en-US" sz="1200" b="0" kern="1200" dirty="0">
+                <a:solidFill>
+                  <a:schemeClr val="tx1"/>
+                </a:solidFill>
+                <a:effectLst/>
+                <a:latin typeface="+mn-lt"/>
+                <a:ea typeface="+mn-ea"/>
+                <a:cs typeface="+mn-cs"/>
+              </a:rPr>
+            </a:br>
+            <a:r>
+              <a:rPr lang="en-US" sz="1200" b="0" kern="1200" dirty="0">
+                <a:solidFill>
+                  <a:schemeClr val="tx1"/>
+                </a:solidFill>
+                <a:effectLst/>
+                <a:latin typeface="+mn-lt"/>
+                <a:ea typeface="+mn-ea"/>
+                <a:cs typeface="+mn-cs"/>
+              </a:rPr>
+              <a:t>Dynamic data masking limits sensitive data exposure by masking the data to nonprivileged users or applications. It can automatically discover potentially sensitive data and suggest the appropriate masks to be applied. Dynamic data masking helps to reduce access so that sensitive data doesn't exit the database via unauthorized access. Customers are responsible for adjusting settings to adhere to their database schema.</a:t>
+            </a:r>
+          </a:p>
+          <a:p>
+            <a:endParaRPr lang="en-US" sz="1200" b="1" i="1" kern="1200" dirty="0">
+              <a:solidFill>
+                <a:schemeClr val="tx1"/>
+              </a:solidFill>
+              <a:effectLst/>
+              <a:latin typeface="+mn-lt"/>
+              <a:ea typeface="+mn-ea"/>
+              <a:cs typeface="+mn-cs"/>
+            </a:endParaRPr>
+          </a:p>
+          <a:p>
             <a:r>
               <a:rPr lang="en-US" sz="1200" b="1" i="1" kern="1200" dirty="0">
                 <a:solidFill>
@@ -1907,44 +2040,6 @@
                 <a:cs typeface="+mn-cs"/>
               </a:rPr>
               <a:t>Yes, Azure Cost Management + Billing has free features via the Cloudyn application that allows you to monitor your cloud spend, drive organizational accountability and optimize your cloud efficiency.  </a:t>
-            </a:r>
-          </a:p>
-          <a:p>
-            <a:r>
-              <a:rPr lang="en-US" sz="1200" b="1" i="1" kern="1200" dirty="0">
-                <a:solidFill>
-                  <a:schemeClr val="tx1"/>
-                </a:solidFill>
-                <a:effectLst/>
-                <a:latin typeface="+mn-lt"/>
-                <a:ea typeface="+mn-ea"/>
-                <a:cs typeface="+mn-cs"/>
-              </a:rPr>
-              <a:t>Does Azure support the ability to allow VPN connections to specific resources?</a:t>
-            </a:r>
-            <a:endParaRPr lang="en-US" sz="1200" kern="1200" dirty="0">
-              <a:solidFill>
-                <a:schemeClr val="tx1"/>
-              </a:solidFill>
-              <a:effectLst/>
-              <a:latin typeface="+mn-lt"/>
-              <a:ea typeface="+mn-ea"/>
-              <a:cs typeface="+mn-cs"/>
-            </a:endParaRPr>
-          </a:p>
-          <a:p>
-            <a:pPr lvl="0"/>
-            <a:r>
-              <a:rPr lang="en-US" sz="1200" kern="1200" dirty="0">
-                <a:solidFill>
-                  <a:schemeClr val="tx1"/>
-                </a:solidFill>
-                <a:effectLst/>
-                <a:latin typeface="+mn-lt"/>
-                <a:ea typeface="+mn-ea"/>
-                <a:cs typeface="+mn-cs"/>
-              </a:rPr>
-              <a:t>Yes, Azure provides the ability to do site-to-site IPSec VPNs and the ability to create point-to-site VPNs.  By utilizing a site-to-site VPN Gateway you can connect your on-premises networks with Azure utilizing IPSec and IKE.  Point-to-site will allow individual client computers to connect to your Azure virtual network(s) via SSTP or IKE.</a:t>
             </a:r>
           </a:p>
           <a:p>
@@ -2031,6 +2126,103 @@
         <p:txBody>
           <a:bodyPr/>
           <a:lstStyle/>
+          <a:p>
+            <a:r>
+              <a:rPr lang="en-US" sz="1200" b="1" i="1" kern="1200" dirty="0">
+                <a:solidFill>
+                  <a:schemeClr val="tx1"/>
+                </a:solidFill>
+                <a:effectLst/>
+                <a:latin typeface="+mn-lt"/>
+                <a:ea typeface="+mn-ea"/>
+                <a:cs typeface="+mn-cs"/>
+              </a:rPr>
+              <a:t>Does Azure support the ability to allow VPN connections to specific resources?</a:t>
+            </a:r>
+            <a:endParaRPr lang="en-US" sz="1200" kern="1200" dirty="0">
+              <a:solidFill>
+                <a:schemeClr val="tx1"/>
+              </a:solidFill>
+              <a:effectLst/>
+              <a:latin typeface="+mn-lt"/>
+              <a:ea typeface="+mn-ea"/>
+              <a:cs typeface="+mn-cs"/>
+            </a:endParaRPr>
+          </a:p>
+          <a:p>
+            <a:pPr lvl="0"/>
+            <a:r>
+              <a:rPr lang="en-US" sz="1200" kern="1200" dirty="0">
+                <a:solidFill>
+                  <a:schemeClr val="tx1"/>
+                </a:solidFill>
+                <a:effectLst/>
+                <a:latin typeface="+mn-lt"/>
+                <a:ea typeface="+mn-ea"/>
+                <a:cs typeface="+mn-cs"/>
+              </a:rPr>
+              <a:t>Yes, Azure provides the ability to do site-to-site </a:t>
+            </a:r>
+            <a:r>
+              <a:rPr lang="en-US" sz="1200" kern="1200" dirty="0" err="1">
+                <a:solidFill>
+                  <a:schemeClr val="tx1"/>
+                </a:solidFill>
+                <a:effectLst/>
+                <a:latin typeface="+mn-lt"/>
+                <a:ea typeface="+mn-ea"/>
+                <a:cs typeface="+mn-cs"/>
+              </a:rPr>
+              <a:t>IPSec</a:t>
+            </a:r>
+            <a:r>
+              <a:rPr lang="en-US" sz="1200" kern="1200" dirty="0">
+                <a:solidFill>
+                  <a:schemeClr val="tx1"/>
+                </a:solidFill>
+                <a:effectLst/>
+                <a:latin typeface="+mn-lt"/>
+                <a:ea typeface="+mn-ea"/>
+                <a:cs typeface="+mn-cs"/>
+              </a:rPr>
+              <a:t> VPNs and the ability to create point-to-site VPNs.  By utilizing a site-to-site VPN Gateway you can connect your on-premises networks with Azure utilizing </a:t>
+            </a:r>
+            <a:r>
+              <a:rPr lang="en-US" sz="1200" kern="1200" dirty="0" err="1">
+                <a:solidFill>
+                  <a:schemeClr val="tx1"/>
+                </a:solidFill>
+                <a:effectLst/>
+                <a:latin typeface="+mn-lt"/>
+                <a:ea typeface="+mn-ea"/>
+                <a:cs typeface="+mn-cs"/>
+              </a:rPr>
+              <a:t>IPSec</a:t>
+            </a:r>
+            <a:r>
+              <a:rPr lang="en-US" sz="1200" kern="1200" dirty="0">
+                <a:solidFill>
+                  <a:schemeClr val="tx1"/>
+                </a:solidFill>
+                <a:effectLst/>
+                <a:latin typeface="+mn-lt"/>
+                <a:ea typeface="+mn-ea"/>
+                <a:cs typeface="+mn-cs"/>
+              </a:rPr>
+              <a:t> and IKE.  Point-to-site will allow individual client computers to connect to your Azure virtual network(s) via SSTP or IKE.</a:t>
+            </a:r>
+          </a:p>
+          <a:p>
+            <a:endParaRPr lang="en-US" sz="1200" b="1" i="1" kern="1200" dirty="0">
+              <a:solidFill>
+                <a:schemeClr val="tx1"/>
+              </a:solidFill>
+              <a:effectLst/>
+              <a:latin typeface="+mn-lt"/>
+              <a:ea typeface="+mn-ea"/>
+              <a:cs typeface="+mn-cs"/>
+            </a:endParaRPr>
+          </a:p>
           <a:p>
             <a:r>
               <a:rPr lang="en-US" sz="1200" b="1" i="1" kern="1200" dirty="0">
@@ -3466,7 +3658,7 @@
                   <a:prstClr val="black"/>
                 </a:solidFill>
               </a:rPr>
-              <a:t>4/26/2019 8:37 AM</a:t>
+              <a:t>11/18/2019 11:59 AM</a:t>
             </a:fld>
             <a:endParaRPr lang="en-US" dirty="0">
               <a:solidFill>
@@ -4399,7 +4591,7 @@
       </p:transition>
     </mc:Fallback>
   </mc:AlternateContent>
-  <p:extLst mod="1">
+  <p:extLst>
     <p:ext uri="{DCECCB84-F9BA-43D5-87BE-67443E8EF086}">
       <p15:sldGuideLst xmlns:p15="http://schemas.microsoft.com/office/powerpoint/2012/main">
         <p15:guide id="1" pos="288">
@@ -15257,7 +15449,7 @@
       </a:lvl9pPr>
     </p:otherStyle>
   </p:txStyles>
-  <p:extLst mod="1">
+  <p:extLst>
     <p:ext uri="{27BBF7A9-308A-43DC-89C8-2F10F3537804}">
       <p15:sldGuideLst xmlns:p15="http://schemas.microsoft.com/office/powerpoint/2012/main">
         <p15:guide id="1" orient="horz" pos="187">
@@ -15872,7 +16064,7 @@
       </a:lvl9pPr>
     </p:otherStyle>
   </p:txStyles>
-  <p:extLst mod="1">
+  <p:extLst>
     <p:ext uri="{27BBF7A9-308A-43DC-89C8-2F10F3537804}">
       <p15:sldGuideLst xmlns:p15="http://schemas.microsoft.com/office/powerpoint/2012/main">
         <p15:guide id="1" orient="horz" pos="187">
@@ -17483,10 +17675,10 @@
       </p:sp>
       <p:pic>
         <p:nvPicPr>
-          <p:cNvPr id="5" name="Picture 4" descr="High-level network architecture&#10;&#10;On the left, an Admin icon and an Agent icon point at an internet icon, which points at a box in the middle. In this box are two intermediate icons for Azure Firewall and Just In Time, then three smaller boxes (WEB-1, PAW-1, and DB-1) that are interconnected with icons for Azure SQL, a DNS server, and an icon of a key on a green circle. The big box in the middle points to four different sites labeled Site 1–4.">
+          <p:cNvPr id="3" name="Picture 2">
             <a:extLst>
               <a:ext uri="{FF2B5EF4-FFF2-40B4-BE49-F238E27FC236}">
-                <a16:creationId xmlns:a16="http://schemas.microsoft.com/office/drawing/2014/main" id="{DAE7A831-BF04-4523-9DD8-62EAEB3230C7}"/>
+                <a16:creationId xmlns:a16="http://schemas.microsoft.com/office/drawing/2014/main" id="{CB9B0027-003D-4E2E-B9C8-5198C727639B}"/>
               </a:ext>
             </a:extLst>
           </p:cNvPr>
@@ -17503,8 +17695,8 @@
         </p:blipFill>
         <p:spPr>
           <a:xfrm>
-            <a:off x="1301053" y="1168806"/>
-            <a:ext cx="9591737" cy="5517721"/>
+            <a:off x="1256564" y="1137840"/>
+            <a:ext cx="9143999" cy="5143500"/>
           </a:xfrm>
           <a:prstGeom prst="rect">
             <a:avLst/>
@@ -18439,6 +18631,13 @@
             </a:r>
           </a:p>
           <a:p>
+            <a:pPr fontAlgn="base"/>
+            <a:r>
+              <a:rPr lang="en-US" dirty="0"/>
+              <a:t>Is Azure SQL secure enough to host their application databases?</a:t>
+            </a:r>
+          </a:p>
+          <a:p>
             <a:pPr lvl="0" fontAlgn="base"/>
             <a:r>
               <a:rPr lang="en-US" sz="3600" dirty="0"/>
@@ -18450,20 +18649,6 @@
             <a:r>
               <a:rPr lang="en-US" sz="3600" dirty="0"/>
               <a:t>Can Azure help contain costs for minimally used costly production and development resources?</a:t>
-            </a:r>
-          </a:p>
-          <a:p>
-            <a:pPr lvl="0" fontAlgn="base"/>
-            <a:r>
-              <a:rPr lang="en-US" sz="3600" dirty="0"/>
-              <a:t>Does Azure support the ability to allow VPN connections </a:t>
-            </a:r>
-            <a:br>
-              <a:rPr lang="en-US" sz="3600" dirty="0"/>
-            </a:br>
-            <a:r>
-              <a:rPr lang="en-US" sz="3600" dirty="0"/>
-              <a:t>to specific resources?</a:t>
             </a:r>
           </a:p>
           <a:p>
@@ -18574,6 +18759,20 @@
             <a:normAutofit/>
           </a:bodyPr>
           <a:lstStyle/>
+          <a:p>
+            <a:pPr lvl="0" fontAlgn="base"/>
+            <a:r>
+              <a:rPr lang="en-US" sz="3600" dirty="0"/>
+              <a:t>Does Azure support the ability to allow VPN connections </a:t>
+            </a:r>
+            <a:br>
+              <a:rPr lang="en-US" sz="3600" dirty="0"/>
+            </a:br>
+            <a:r>
+              <a:rPr lang="en-US" sz="3600" dirty="0"/>
+              <a:t>to specific resources?</a:t>
+            </a:r>
+          </a:p>
           <a:p>
             <a:pPr lvl="0" fontAlgn="base"/>
             <a:r>
@@ -20876,15 +21075,6 @@
 </file>
 
 <file path=customXml/item1.xml><?xml version="1.0" encoding="utf-8"?>
-<?mso-contentType ?>
-<FormTemplates xmlns="http://schemas.microsoft.com/sharepoint/v3/contenttype/forms">
-  <Display>DocumentLibraryForm</Display>
-  <Edit>DocumentLibraryForm</Edit>
-  <New>DocumentLibraryForm</New>
-</FormTemplates>
-</file>
-
-<file path=customXml/item2.xml><?xml version="1.0" encoding="utf-8"?>
 <ct:contentTypeSchema xmlns:ct="http://schemas.microsoft.com/office/2006/metadata/contentType" xmlns:ma="http://schemas.microsoft.com/office/2006/metadata/properties/metaAttributes" ct:_="" ma:_="" ma:contentTypeName="Document" ma:contentTypeID="0x010100D15DFA3690A15B4081582BBCC6BEAC3E" ma:contentTypeVersion="9" ma:contentTypeDescription="Create a new document." ma:contentTypeScope="" ma:versionID="642da1784587cbe85a7fdbbe4dc36103">
   <xsd:schema xmlns:xsd="http://www.w3.org/2001/XMLSchema" xmlns:xs="http://www.w3.org/2001/XMLSchema" xmlns:p="http://schemas.microsoft.com/office/2006/metadata/properties" xmlns:ns1="http://schemas.microsoft.com/sharepoint/v3" xmlns:ns2="2023ac63-7b75-4916-a9ee-591457758eee" xmlns:ns3="d9c797ad-d7c3-4982-82b7-81352a75e4a5" targetNamespace="http://schemas.microsoft.com/office/2006/metadata/properties" ma:root="true" ma:fieldsID="91198b0246576053cc55dd2c67035a89" ns1:_="" ns2:_="" ns3:_="">
     <xsd:import namespace="http://schemas.microsoft.com/sharepoint/v3"/>
@@ -21086,6 +21276,15 @@
 </ct:contentTypeSchema>
 </file>
 
+<file path=customXml/item2.xml><?xml version="1.0" encoding="utf-8"?>
+<?mso-contentType ?>
+<FormTemplates xmlns="http://schemas.microsoft.com/sharepoint/v3/contenttype/forms">
+  <Display>DocumentLibraryForm</Display>
+  <Edit>DocumentLibraryForm</Edit>
+  <New>DocumentLibraryForm</New>
+</FormTemplates>
+</file>
+
 <file path=customXml/item3.xml><?xml version="1.0" encoding="utf-8"?>
 <p:properties xmlns:p="http://schemas.microsoft.com/office/2006/metadata/properties" xmlns:xsi="http://www.w3.org/2001/XMLSchema-instance" xmlns:pc="http://schemas.microsoft.com/office/infopath/2007/PartnerControls">
   <documentManagement>
@@ -21096,14 +21295,6 @@
 </file>
 
 <file path=customXml/itemProps1.xml><?xml version="1.0" encoding="utf-8"?>
-<ds:datastoreItem xmlns:ds="http://schemas.openxmlformats.org/officeDocument/2006/customXml" ds:itemID="{B548A0C0-DC97-4384-A030-1862D9120D4E}">
-  <ds:schemaRefs>
-    <ds:schemaRef ds:uri="http://schemas.microsoft.com/sharepoint/v3/contenttype/forms"/>
-  </ds:schemaRefs>
-</ds:datastoreItem>
-</file>
-
-<file path=customXml/itemProps2.xml><?xml version="1.0" encoding="utf-8"?>
 <ds:datastoreItem xmlns:ds="http://schemas.openxmlformats.org/officeDocument/2006/customXml" ds:itemID="{073ED2AD-E7AD-4156-9686-5BAF016490A0}">
   <ds:schemaRefs>
     <ds:schemaRef ds:uri="http://schemas.microsoft.com/office/2006/metadata/contentType"/>
@@ -21119,6 +21310,14 @@
     <ds:schemaRef ds:uri="http://purl.org/dc/elements/1.1/"/>
     <ds:schemaRef ds:uri="http://purl.org/dc/terms/"/>
     <ds:schemaRef ds:uri="http://schemas.microsoft.com/internal/obd"/>
+  </ds:schemaRefs>
+</ds:datastoreItem>
+</file>
+
+<file path=customXml/itemProps2.xml><?xml version="1.0" encoding="utf-8"?>
+<ds:datastoreItem xmlns:ds="http://schemas.openxmlformats.org/officeDocument/2006/customXml" ds:itemID="{B548A0C0-DC97-4384-A030-1862D9120D4E}">
+  <ds:schemaRefs>
+    <ds:schemaRef ds:uri="http://schemas.microsoft.com/sharepoint/v3/contenttype/forms"/>
   </ds:schemaRefs>
 </ds:datastoreItem>
 </file>

</xml_diff>

<commit_message>
formatting fixes and some clarifications
</commit_message>
<xml_diff>
--- a/Whiteboard design session/WDS trainer presentation - Security baseline on Azure.pptx
+++ b/Whiteboard design session/WDS trainer presentation - Security baseline on Azure.pptx
@@ -244,7 +244,7 @@
           <a:p>
             <a:fld id="{52A13B17-C506-4D51-BB37-16B365906619}" type="datetimeFigureOut">
               <a:rPr lang="en-US" smtClean="0"/>
-              <a:t>1/28/2020</a:t>
+              <a:t>2/3/2020</a:t>
             </a:fld>
             <a:endParaRPr lang="en-US" dirty="0"/>
           </a:p>
@@ -4696,7 +4696,7 @@
                   <a:prstClr val="black"/>
                 </a:solidFill>
               </a:rPr>
-              <a:t>1/28/2020 2:14 PM</a:t>
+              <a:t>2/3/2020 4:19 PM</a:t>
             </a:fld>
             <a:endParaRPr lang="en-US" dirty="0">
               <a:solidFill>
@@ -19947,7 +19947,7 @@
                 </a:solidFill>
                 <a:cs typeface="Segoe UI" panose="020B0502040204020203" pitchFamily="34" charset="0"/>
               </a:rPr>
-              <a:t>Preferred solution</a:t>
+              <a:t>Preferred solution (#2)</a:t>
             </a:r>
             <a:br>
               <a:rPr lang="en-US" dirty="0">
@@ -20239,7 +20239,7 @@
                 </a:solidFill>
                 <a:cs typeface="Segoe UI" panose="020B0502040204020203" pitchFamily="34" charset="0"/>
               </a:rPr>
-              <a:t>Preferred solution</a:t>
+              <a:t>Preferred solution (#3)</a:t>
             </a:r>
             <a:br>
               <a:rPr lang="en-US" dirty="0">
@@ -20512,7 +20512,7 @@
                 </a:solidFill>
                 <a:cs typeface="Segoe UI" panose="020B0502040204020203" pitchFamily="34" charset="0"/>
               </a:rPr>
-              <a:t>Preferred solution</a:t>
+              <a:t>Preferred solution (#4)</a:t>
             </a:r>
             <a:br>
               <a:rPr lang="en-US" dirty="0">
@@ -20713,7 +20713,7 @@
                 </a:solidFill>
                 <a:cs typeface="Segoe UI" panose="020B0502040204020203" pitchFamily="34" charset="0"/>
               </a:rPr>
-              <a:t>Preferred solution</a:t>
+              <a:t>Preferred solution (#5)</a:t>
             </a:r>
             <a:br>
               <a:rPr lang="en-US" dirty="0">
@@ -20950,7 +20950,7 @@
                 </a:solidFill>
                 <a:cs typeface="Segoe UI" panose="020B0502040204020203" pitchFamily="34" charset="0"/>
               </a:rPr>
-              <a:t>Preferred solution</a:t>
+              <a:t>Preferred solution (#6)</a:t>
             </a:r>
             <a:br>
               <a:rPr lang="en-US" dirty="0">
@@ -21118,7 +21118,7 @@
                 </a:solidFill>
                 <a:cs typeface="Segoe UI" panose="020B0502040204020203" pitchFamily="34" charset="0"/>
               </a:rPr>
-              <a:t>Preferred solution</a:t>
+              <a:t>Preferred solution (#7)</a:t>
             </a:r>
             <a:br>
               <a:rPr lang="en-US" dirty="0">
@@ -21618,7 +21618,7 @@
                   <a:schemeClr val="tx1"/>
                 </a:solidFill>
               </a:rPr>
-              <a:t>Preferred objections handling</a:t>
+              <a:t>Preferred objections handling (#2)</a:t>
             </a:r>
             <a:endParaRPr lang="en-US" sz="3236" dirty="0">
               <a:solidFill>
@@ -21776,7 +21776,7 @@
                   <a:schemeClr val="tx1"/>
                 </a:solidFill>
               </a:rPr>
-              <a:t>Preferred objections handling</a:t>
+              <a:t>Preferred objections handling (#3)</a:t>
             </a:r>
             <a:br>
               <a:rPr lang="en-US" dirty="0">
@@ -22290,7 +22290,7 @@
                 </a:solidFill>
                 <a:cs typeface="Segoe UI" panose="020B0502040204020203" pitchFamily="34" charset="0"/>
               </a:rPr>
-              <a:t>Customer situation</a:t>
+              <a:t>Customer situation (#2)</a:t>
             </a:r>
             <a:br>
               <a:rPr lang="en-US" dirty="0">
@@ -23823,21 +23823,21 @@
 </file>
 
 <file path=customXml/item1.xml><?xml version="1.0" encoding="utf-8"?>
+<p:properties xmlns:p="http://schemas.microsoft.com/office/2006/metadata/properties" xmlns:xsi="http://www.w3.org/2001/XMLSchema-instance" xmlns:pc="http://schemas.microsoft.com/office/infopath/2007/PartnerControls">
+  <documentManagement>
+    <_ip_UnifiedCompliancePolicyUIAction xmlns="http://schemas.microsoft.com/sharepoint/v3" xsi:nil="true"/>
+    <_ip_UnifiedCompliancePolicyProperties xmlns="http://schemas.microsoft.com/sharepoint/v3" xsi:nil="true"/>
+  </documentManagement>
+</p:properties>
+</file>
+
+<file path=customXml/item2.xml><?xml version="1.0" encoding="utf-8"?>
 <?mso-contentType ?>
 <FormTemplates xmlns="http://schemas.microsoft.com/sharepoint/v3/contenttype/forms">
   <Display>DocumentLibraryForm</Display>
   <Edit>DocumentLibraryForm</Edit>
   <New>DocumentLibraryForm</New>
 </FormTemplates>
-</file>
-
-<file path=customXml/item2.xml><?xml version="1.0" encoding="utf-8"?>
-<p:properties xmlns:p="http://schemas.microsoft.com/office/2006/metadata/properties" xmlns:xsi="http://www.w3.org/2001/XMLSchema-instance" xmlns:pc="http://schemas.microsoft.com/office/infopath/2007/PartnerControls">
-  <documentManagement>
-    <_ip_UnifiedCompliancePolicyUIAction xmlns="http://schemas.microsoft.com/sharepoint/v3" xsi:nil="true"/>
-    <_ip_UnifiedCompliancePolicyProperties xmlns="http://schemas.microsoft.com/sharepoint/v3" xsi:nil="true"/>
-  </documentManagement>
-</p:properties>
 </file>
 
 <file path=customXml/item3.xml><?xml version="1.0" encoding="utf-8"?>
@@ -24043,27 +24043,27 @@
 </file>
 
 <file path=customXml/itemProps1.xml><?xml version="1.0" encoding="utf-8"?>
-<ds:datastoreItem xmlns:ds="http://schemas.openxmlformats.org/officeDocument/2006/customXml" ds:itemID="{B548A0C0-DC97-4384-A030-1862D9120D4E}">
+<ds:datastoreItem xmlns:ds="http://schemas.openxmlformats.org/officeDocument/2006/customXml" ds:itemID="{CE655EA9-4351-4C51-BD9A-4F8469CD6ADD}">
   <ds:schemaRefs>
-    <ds:schemaRef ds:uri="http://schemas.microsoft.com/sharepoint/v3/contenttype/forms"/>
+    <ds:schemaRef ds:uri="http://schemas.microsoft.com/office/2006/documentManagement/types"/>
+    <ds:schemaRef ds:uri="http://schemas.openxmlformats.org/package/2006/metadata/core-properties"/>
+    <ds:schemaRef ds:uri="http://purl.org/dc/elements/1.1/"/>
+    <ds:schemaRef ds:uri="http://www.w3.org/XML/1998/namespace"/>
+    <ds:schemaRef ds:uri="http://schemas.microsoft.com/office/infopath/2007/PartnerControls"/>
+    <ds:schemaRef ds:uri="2023ac63-7b75-4916-a9ee-591457758eee"/>
+    <ds:schemaRef ds:uri="http://purl.org/dc/terms/"/>
+    <ds:schemaRef ds:uri="d9c797ad-d7c3-4982-82b7-81352a75e4a5"/>
+    <ds:schemaRef ds:uri="http://schemas.microsoft.com/sharepoint/v3"/>
+    <ds:schemaRef ds:uri="http://schemas.microsoft.com/office/2006/metadata/properties"/>
+    <ds:schemaRef ds:uri="http://purl.org/dc/dcmitype/"/>
   </ds:schemaRefs>
 </ds:datastoreItem>
 </file>
 
 <file path=customXml/itemProps2.xml><?xml version="1.0" encoding="utf-8"?>
-<ds:datastoreItem xmlns:ds="http://schemas.openxmlformats.org/officeDocument/2006/customXml" ds:itemID="{CE655EA9-4351-4C51-BD9A-4F8469CD6ADD}">
+<ds:datastoreItem xmlns:ds="http://schemas.openxmlformats.org/officeDocument/2006/customXml" ds:itemID="{B548A0C0-DC97-4384-A030-1862D9120D4E}">
   <ds:schemaRefs>
-    <ds:schemaRef ds:uri="2023ac63-7b75-4916-a9ee-591457758eee"/>
-    <ds:schemaRef ds:uri="http://purl.org/dc/elements/1.1/"/>
-    <ds:schemaRef ds:uri="http://schemas.microsoft.com/office/2006/metadata/properties"/>
-    <ds:schemaRef ds:uri="http://schemas.microsoft.com/sharepoint/v3"/>
-    <ds:schemaRef ds:uri="http://purl.org/dc/terms/"/>
-    <ds:schemaRef ds:uri="http://schemas.openxmlformats.org/package/2006/metadata/core-properties"/>
-    <ds:schemaRef ds:uri="http://schemas.microsoft.com/office/2006/documentManagement/types"/>
-    <ds:schemaRef ds:uri="http://schemas.microsoft.com/office/infopath/2007/PartnerControls"/>
-    <ds:schemaRef ds:uri="d9c797ad-d7c3-4982-82b7-81352a75e4a5"/>
-    <ds:schemaRef ds:uri="http://www.w3.org/XML/1998/namespace"/>
-    <ds:schemaRef ds:uri="http://purl.org/dc/dcmitype/"/>
+    <ds:schemaRef ds:uri="http://schemas.microsoft.com/sharepoint/v3/contenttype/forms"/>
   </ds:schemaRefs>
 </ds:datastoreItem>
 </file>

</xml_diff>